<commit_message>
edit sub and title
</commit_message>
<xml_diff>
--- a/ipp.pptx
+++ b/ipp.pptx
@@ -11,6 +11,8 @@
     <p:sldId id="259" r:id="rId5"/>
     <p:sldId id="260" r:id="rId6"/>
     <p:sldId id="261" r:id="rId7"/>
+    <p:sldId id="262" r:id="rId8"/>
+    <p:sldId id="263" r:id="rId9"/>
   </p:sldIdLst>
   <p:sldSz cx="12192000" cy="6858000"/>
   <p:notesSz cx="6858000" cy="9144000"/>
@@ -3075,12 +3077,14 @@
             <a:spLocks noGrp="1"/>
           </p:cNvSpPr>
           <p:nvPr>
-            <p:ph idx="1"/>
-          </p:nvPr>
-        </p:nvSpPr>
-        <p:spPr/>
-        <p:txBody>
-          <a:bodyPr/>
+            <p:ph type="body" idx="1"/>
+          </p:nvPr>
+        </p:nvSpPr>
+        <p:spPr/>
+        <p:txBody>
+          <a:bodyPr>
+            <a:normAutofit fontScale="92500" lnSpcReduction="20000"/>
+          </a:bodyPr>
           <a:lstStyle/>
           <a:p>
             <a:r>
@@ -3097,19 +3101,7 @@
           <a:p>
             <a:r>
               <a:rPr lang="en-US" dirty="0"/>
-              <a:t>Manufacturing Process Risk</a:t>
-            </a:r>
-          </a:p>
-          <a:p>
-            <a:r>
-              <a:rPr lang="en-US" dirty="0"/>
-              <a:t>Overcoming Threats Possibility</a:t>
-            </a:r>
-          </a:p>
-          <a:p>
-            <a:r>
-              <a:rPr lang="en-US" dirty="0"/>
-              <a:t>How we do it</a:t>
+              <a:t>Intellectual Property Protection</a:t>
             </a:r>
           </a:p>
           <a:p>
@@ -3183,7 +3175,7 @@
             <a:spLocks noGrp="1"/>
           </p:cNvSpPr>
           <p:nvPr>
-            <p:ph idx="1"/>
+            <p:ph type="body" idx="1"/>
           </p:nvPr>
         </p:nvSpPr>
         <p:spPr/>
@@ -3265,7 +3257,7 @@
             <a:spLocks noGrp="1"/>
           </p:cNvSpPr>
           <p:nvPr>
-            <p:ph idx="1"/>
+            <p:ph type="body" idx="1"/>
           </p:nvPr>
         </p:nvSpPr>
         <p:spPr/>
@@ -3347,7 +3339,7 @@
             <a:spLocks noGrp="1"/>
           </p:cNvSpPr>
           <p:nvPr>
-            <p:ph idx="1"/>
+            <p:ph type="body" idx="1"/>
           </p:nvPr>
         </p:nvSpPr>
         <p:spPr/>
@@ -3409,21 +3401,21 @@
           <a:lstStyle/>
           <a:p>
             <a:r>
-              <a:rPr lang="en-US"/>
+              <a:rPr lang="en-US" dirty="0"/>
               <a:t>Overcoming Threats Possibility</a:t>
             </a:r>
-            <a:endParaRPr lang="id-ID"/>
-          </a:p>
-        </p:txBody>
-      </p:sp>
-      <p:sp>
-        <p:nvSpPr>
-          <p:cNvPr id="3" name="Content Placeholder 2"/>
-          <p:cNvSpPr>
-            <a:spLocks noGrp="1"/>
-          </p:cNvSpPr>
-          <p:nvPr>
-            <p:ph idx="1"/>
+            <a:endParaRPr lang="id-ID" dirty="0"/>
+          </a:p>
+        </p:txBody>
+      </p:sp>
+      <p:sp>
+        <p:nvSpPr>
+          <p:cNvPr id="4" name="Text Placeholder 3"/>
+          <p:cNvSpPr>
+            <a:spLocks noGrp="1"/>
+          </p:cNvSpPr>
+          <p:nvPr>
+            <p:ph type="body" idx="1"/>
           </p:nvPr>
         </p:nvSpPr>
         <p:spPr/>
@@ -3439,6 +3431,193 @@
     <p:extLst>
       <p:ext uri="{BB962C8B-B14F-4D97-AF65-F5344CB8AC3E}">
         <p14:creationId xmlns:p14="http://schemas.microsoft.com/office/powerpoint/2010/main" val="3630299229"/>
+      </p:ext>
+    </p:extLst>
+  </p:cSld>
+  <p:clrMapOvr>
+    <a:masterClrMapping/>
+  </p:clrMapOvr>
+</p:sld>
+</file>
+
+<file path=ppt/slides/slide7.xml><?xml version="1.0" encoding="utf-8"?>
+<p:sld xmlns:a="http://schemas.openxmlformats.org/drawingml/2006/main" xmlns:r="http://schemas.openxmlformats.org/officeDocument/2006/relationships" xmlns:p="http://schemas.openxmlformats.org/presentationml/2006/main">
+  <p:cSld>
+    <p:spTree>
+      <p:nvGrpSpPr>
+        <p:cNvPr id="1" name=""/>
+        <p:cNvGrpSpPr/>
+        <p:nvPr/>
+      </p:nvGrpSpPr>
+      <p:grpSpPr>
+        <a:xfrm>
+          <a:off x="0" y="0"/>
+          <a:ext cx="0" cy="0"/>
+          <a:chOff x="0" y="0"/>
+          <a:chExt cx="0" cy="0"/>
+        </a:xfrm>
+      </p:grpSpPr>
+      <p:sp>
+        <p:nvSpPr>
+          <p:cNvPr id="2" name="Title 1"/>
+          <p:cNvSpPr>
+            <a:spLocks noGrp="1"/>
+          </p:cNvSpPr>
+          <p:nvPr>
+            <p:ph type="title"/>
+          </p:nvPr>
+        </p:nvSpPr>
+        <p:spPr/>
+        <p:txBody>
+          <a:bodyPr/>
+          <a:lstStyle/>
+          <a:p>
+            <a:r>
+              <a:rPr lang="en-US" dirty="0"/>
+              <a:t>How We did It</a:t>
+            </a:r>
+            <a:endParaRPr lang="id-ID" dirty="0"/>
+          </a:p>
+        </p:txBody>
+      </p:sp>
+      <p:sp>
+        <p:nvSpPr>
+          <p:cNvPr id="3" name="Content Placeholder 2"/>
+          <p:cNvSpPr>
+            <a:spLocks noGrp="1"/>
+          </p:cNvSpPr>
+          <p:nvPr>
+            <p:ph type="body" idx="1"/>
+          </p:nvPr>
+        </p:nvSpPr>
+        <p:spPr/>
+        <p:txBody>
+          <a:bodyPr>
+            <a:normAutofit fontScale="92500" lnSpcReduction="20000"/>
+          </a:bodyPr>
+          <a:lstStyle/>
+          <a:p>
+            <a:r>
+              <a:rPr lang="en-US" dirty="0"/>
+              <a:t>Design</a:t>
+            </a:r>
+          </a:p>
+          <a:p>
+            <a:r>
+              <a:rPr lang="en-US" dirty="0"/>
+              <a:t>Simulation</a:t>
+            </a:r>
+          </a:p>
+          <a:p>
+            <a:r>
+              <a:rPr lang="en-US" dirty="0"/>
+              <a:t>Result</a:t>
+            </a:r>
+          </a:p>
+          <a:p>
+            <a:r>
+              <a:rPr lang="en-US" dirty="0"/>
+              <a:t>Conclusion</a:t>
+            </a:r>
+          </a:p>
+          <a:p>
+            <a:endParaRPr lang="en-US" dirty="0"/>
+          </a:p>
+        </p:txBody>
+      </p:sp>
+    </p:spTree>
+    <p:extLst>
+      <p:ext uri="{BB962C8B-B14F-4D97-AF65-F5344CB8AC3E}">
+        <p14:creationId xmlns:p14="http://schemas.microsoft.com/office/powerpoint/2010/main" val="41176834"/>
+      </p:ext>
+    </p:extLst>
+  </p:cSld>
+  <p:clrMapOvr>
+    <a:masterClrMapping/>
+  </p:clrMapOvr>
+</p:sld>
+</file>
+
+<file path=ppt/slides/slide8.xml><?xml version="1.0" encoding="utf-8"?>
+<p:sld xmlns:a="http://schemas.openxmlformats.org/drawingml/2006/main" xmlns:r="http://schemas.openxmlformats.org/officeDocument/2006/relationships" xmlns:p="http://schemas.openxmlformats.org/presentationml/2006/main">
+  <p:cSld>
+    <p:spTree>
+      <p:nvGrpSpPr>
+        <p:cNvPr id="1" name=""/>
+        <p:cNvGrpSpPr/>
+        <p:nvPr/>
+      </p:nvGrpSpPr>
+      <p:grpSpPr>
+        <a:xfrm>
+          <a:off x="0" y="0"/>
+          <a:ext cx="0" cy="0"/>
+          <a:chOff x="0" y="0"/>
+          <a:chExt cx="0" cy="0"/>
+        </a:xfrm>
+      </p:grpSpPr>
+      <p:sp>
+        <p:nvSpPr>
+          <p:cNvPr id="2" name="Title 1"/>
+          <p:cNvSpPr>
+            <a:spLocks noGrp="1"/>
+          </p:cNvSpPr>
+          <p:nvPr>
+            <p:ph type="title"/>
+          </p:nvPr>
+        </p:nvSpPr>
+        <p:spPr/>
+        <p:txBody>
+          <a:bodyPr/>
+          <a:lstStyle/>
+          <a:p>
+            <a:r>
+              <a:rPr lang="en-US" dirty="0"/>
+              <a:t>Problem Encounter</a:t>
+            </a:r>
+            <a:endParaRPr lang="id-ID" dirty="0"/>
+          </a:p>
+        </p:txBody>
+      </p:sp>
+      <p:sp>
+        <p:nvSpPr>
+          <p:cNvPr id="3" name="Content Placeholder 2"/>
+          <p:cNvSpPr>
+            <a:spLocks noGrp="1"/>
+          </p:cNvSpPr>
+          <p:nvPr>
+            <p:ph type="body" idx="1"/>
+          </p:nvPr>
+        </p:nvSpPr>
+        <p:spPr/>
+        <p:txBody>
+          <a:bodyPr>
+            <a:normAutofit/>
+          </a:bodyPr>
+          <a:lstStyle/>
+          <a:p>
+            <a:r>
+              <a:rPr lang="en-US" dirty="0"/>
+              <a:t>Resource</a:t>
+            </a:r>
+          </a:p>
+          <a:p>
+            <a:r>
+              <a:rPr lang="en-US" dirty="0"/>
+              <a:t>Technical</a:t>
+            </a:r>
+          </a:p>
+          <a:p>
+            <a:r>
+              <a:rPr lang="en-US" dirty="0"/>
+              <a:t>Time</a:t>
+            </a:r>
+          </a:p>
+        </p:txBody>
+      </p:sp>
+    </p:spTree>
+    <p:extLst>
+      <p:ext uri="{BB962C8B-B14F-4D97-AF65-F5344CB8AC3E}">
+        <p14:creationId xmlns:p14="http://schemas.microsoft.com/office/powerpoint/2010/main" val="566636018"/>
       </p:ext>
     </p:extLst>
   </p:cSld>

</xml_diff>